<commit_message>
Connect Client to Api & get values
</commit_message>
<xml_diff>
--- a/Presentation/Techorama sessie 2019_RoMe.pptx
+++ b/Presentation/Techorama sessie 2019_RoMe.pptx
@@ -5,7 +5,7 @@
     <p:sldMasterId id="2147483660" r:id="rId1"/>
   </p:sldMasterIdLst>
   <p:notesMasterIdLst>
-    <p:notesMasterId r:id="rId9"/>
+    <p:notesMasterId r:id="rId10"/>
   </p:notesMasterIdLst>
   <p:sldIdLst>
     <p:sldId id="256" r:id="rId2"/>
@@ -15,6 +15,7 @@
     <p:sldId id="266" r:id="rId6"/>
     <p:sldId id="267" r:id="rId7"/>
     <p:sldId id="268" r:id="rId8"/>
+    <p:sldId id="269" r:id="rId9"/>
   </p:sldIdLst>
   <p:sldSz cx="12192000" cy="6858000"/>
   <p:notesSz cx="6858000" cy="9144000"/>
@@ -203,7 +204,7 @@
           <a:p>
             <a:fld id="{79CDC471-DDF2-433F-A5F6-544F0A710411}" type="datetimeFigureOut">
               <a:rPr lang="en-NL" smtClean="0"/>
-              <a:t>17/02/2019</a:t>
+              <a:t>19/02/2019</a:t>
             </a:fld>
             <a:endParaRPr lang="en-NL"/>
           </a:p>
@@ -913,7 +914,7 @@
           <a:p>
             <a:fld id="{94BB1E4B-6BAD-4B53-9078-FE57BE311D48}" type="datetimeFigureOut">
               <a:rPr lang="en-NL" smtClean="0"/>
-              <a:t>17/02/2019</a:t>
+              <a:t>19/02/2019</a:t>
             </a:fld>
             <a:endParaRPr lang="en-NL"/>
           </a:p>
@@ -1327,7 +1328,7 @@
           <a:p>
             <a:fld id="{94BB1E4B-6BAD-4B53-9078-FE57BE311D48}" type="datetimeFigureOut">
               <a:rPr lang="en-NL" smtClean="0"/>
-              <a:t>17/02/2019</a:t>
+              <a:t>19/02/2019</a:t>
             </a:fld>
             <a:endParaRPr lang="en-NL"/>
           </a:p>
@@ -1663,7 +1664,7 @@
           <a:p>
             <a:fld id="{94BB1E4B-6BAD-4B53-9078-FE57BE311D48}" type="datetimeFigureOut">
               <a:rPr lang="en-NL" smtClean="0"/>
-              <a:t>17/02/2019</a:t>
+              <a:t>19/02/2019</a:t>
             </a:fld>
             <a:endParaRPr lang="en-NL"/>
           </a:p>
@@ -2068,7 +2069,7 @@
           <a:p>
             <a:fld id="{94BB1E4B-6BAD-4B53-9078-FE57BE311D48}" type="datetimeFigureOut">
               <a:rPr lang="en-NL" smtClean="0"/>
-              <a:t>17/02/2019</a:t>
+              <a:t>19/02/2019</a:t>
             </a:fld>
             <a:endParaRPr lang="en-NL"/>
           </a:p>
@@ -2636,7 +2637,7 @@
           <a:p>
             <a:fld id="{94BB1E4B-6BAD-4B53-9078-FE57BE311D48}" type="datetimeFigureOut">
               <a:rPr lang="en-NL" smtClean="0"/>
-              <a:t>17/02/2019</a:t>
+              <a:t>19/02/2019</a:t>
             </a:fld>
             <a:endParaRPr lang="en-NL"/>
           </a:p>
@@ -3317,7 +3318,7 @@
           <a:p>
             <a:fld id="{94BB1E4B-6BAD-4B53-9078-FE57BE311D48}" type="datetimeFigureOut">
               <a:rPr lang="en-NL" smtClean="0"/>
-              <a:t>17/02/2019</a:t>
+              <a:t>19/02/2019</a:t>
             </a:fld>
             <a:endParaRPr lang="en-NL"/>
           </a:p>
@@ -4230,7 +4231,7 @@
           <a:p>
             <a:fld id="{94BB1E4B-6BAD-4B53-9078-FE57BE311D48}" type="datetimeFigureOut">
               <a:rPr lang="en-NL" smtClean="0"/>
-              <a:t>17/02/2019</a:t>
+              <a:t>19/02/2019</a:t>
             </a:fld>
             <a:endParaRPr lang="en-NL"/>
           </a:p>
@@ -4543,7 +4544,7 @@
           <a:p>
             <a:fld id="{94BB1E4B-6BAD-4B53-9078-FE57BE311D48}" type="datetimeFigureOut">
               <a:rPr lang="en-NL" smtClean="0"/>
-              <a:t>17/02/2019</a:t>
+              <a:t>19/02/2019</a:t>
             </a:fld>
             <a:endParaRPr lang="en-NL"/>
           </a:p>
@@ -4807,7 +4808,7 @@
           <a:p>
             <a:fld id="{94BB1E4B-6BAD-4B53-9078-FE57BE311D48}" type="datetimeFigureOut">
               <a:rPr lang="en-NL" smtClean="0"/>
-              <a:t>17/02/2019</a:t>
+              <a:t>19/02/2019</a:t>
             </a:fld>
             <a:endParaRPr lang="en-NL"/>
           </a:p>
@@ -5130,7 +5131,7 @@
           <a:p>
             <a:fld id="{94BB1E4B-6BAD-4B53-9078-FE57BE311D48}" type="datetimeFigureOut">
               <a:rPr lang="en-NL" smtClean="0"/>
-              <a:t>17/02/2019</a:t>
+              <a:t>19/02/2019</a:t>
             </a:fld>
             <a:endParaRPr lang="en-NL"/>
           </a:p>
@@ -5519,7 +5520,7 @@
           <a:p>
             <a:fld id="{94BB1E4B-6BAD-4B53-9078-FE57BE311D48}" type="datetimeFigureOut">
               <a:rPr lang="en-NL" smtClean="0"/>
-              <a:t>17/02/2019</a:t>
+              <a:t>19/02/2019</a:t>
             </a:fld>
             <a:endParaRPr lang="en-NL"/>
           </a:p>
@@ -5895,7 +5896,7 @@
           <a:p>
             <a:fld id="{94BB1E4B-6BAD-4B53-9078-FE57BE311D48}" type="datetimeFigureOut">
               <a:rPr lang="en-NL" smtClean="0"/>
-              <a:t>17/02/2019</a:t>
+              <a:t>19/02/2019</a:t>
             </a:fld>
             <a:endParaRPr lang="en-NL"/>
           </a:p>
@@ -6401,7 +6402,7 @@
           <a:p>
             <a:fld id="{94BB1E4B-6BAD-4B53-9078-FE57BE311D48}" type="datetimeFigureOut">
               <a:rPr lang="en-NL" smtClean="0"/>
-              <a:t>17/02/2019</a:t>
+              <a:t>19/02/2019</a:t>
             </a:fld>
             <a:endParaRPr lang="en-NL"/>
           </a:p>
@@ -6658,7 +6659,7 @@
           <a:p>
             <a:fld id="{94BB1E4B-6BAD-4B53-9078-FE57BE311D48}" type="datetimeFigureOut">
               <a:rPr lang="en-NL" smtClean="0"/>
-              <a:t>17/02/2019</a:t>
+              <a:t>19/02/2019</a:t>
             </a:fld>
             <a:endParaRPr lang="en-NL"/>
           </a:p>
@@ -6821,7 +6822,7 @@
           <a:p>
             <a:fld id="{94BB1E4B-6BAD-4B53-9078-FE57BE311D48}" type="datetimeFigureOut">
               <a:rPr lang="en-NL" smtClean="0"/>
-              <a:t>17/02/2019</a:t>
+              <a:t>19/02/2019</a:t>
             </a:fld>
             <a:endParaRPr lang="en-NL"/>
           </a:p>
@@ -7211,7 +7212,7 @@
           <a:p>
             <a:fld id="{94BB1E4B-6BAD-4B53-9078-FE57BE311D48}" type="datetimeFigureOut">
               <a:rPr lang="en-NL" smtClean="0"/>
-              <a:t>17/02/2019</a:t>
+              <a:t>19/02/2019</a:t>
             </a:fld>
             <a:endParaRPr lang="en-NL"/>
           </a:p>
@@ -7620,7 +7621,7 @@
           <a:p>
             <a:fld id="{94BB1E4B-6BAD-4B53-9078-FE57BE311D48}" type="datetimeFigureOut">
               <a:rPr lang="en-NL" smtClean="0"/>
-              <a:t>17/02/2019</a:t>
+              <a:t>19/02/2019</a:t>
             </a:fld>
             <a:endParaRPr lang="en-NL"/>
           </a:p>
@@ -7864,7 +7865,7 @@
           <a:p>
             <a:fld id="{94BB1E4B-6BAD-4B53-9078-FE57BE311D48}" type="datetimeFigureOut">
               <a:rPr lang="en-NL" smtClean="0"/>
-              <a:t>17/02/2019</a:t>
+              <a:t>19/02/2019</a:t>
             </a:fld>
             <a:endParaRPr lang="en-NL"/>
           </a:p>
@@ -8298,7 +8299,7 @@
           <a:p>
             <a:r>
               <a:rPr lang="en-GB" dirty="0" err="1"/>
-              <a:t>Techorama</a:t>
+              <a:t>Kennis</a:t>
             </a:r>
             <a:r>
               <a:rPr lang="en-GB" dirty="0"/>
@@ -8341,17 +8342,6 @@
               <a:rPr lang="en-GB" dirty="0"/>
               <a:t>Ronald van Meer</a:t>
             </a:r>
-          </a:p>
-          <a:p>
-            <a:r>
-              <a:rPr lang="en-GB" dirty="0"/>
-              <a:t>Michael </a:t>
-            </a:r>
-            <a:r>
-              <a:rPr lang="en-GB" dirty="0" err="1"/>
-              <a:t>Rozenbeek</a:t>
-            </a:r>
-            <a:endParaRPr lang="en-NL" dirty="0"/>
           </a:p>
         </p:txBody>
       </p:sp>
@@ -9518,6 +9508,104 @@
     <p:extLst>
       <p:ext uri="{BB962C8B-B14F-4D97-AF65-F5344CB8AC3E}">
         <p14:creationId xmlns:p14="http://schemas.microsoft.com/office/powerpoint/2010/main" val="3350001037"/>
+      </p:ext>
+    </p:extLst>
+  </p:cSld>
+  <p:clrMapOvr>
+    <a:masterClrMapping/>
+  </p:clrMapOvr>
+</p:sld>
+</file>
+
+<file path=ppt/slides/slide8.xml><?xml version="1.0" encoding="utf-8"?>
+<p:sld xmlns:a="http://schemas.openxmlformats.org/drawingml/2006/main" xmlns:r="http://schemas.openxmlformats.org/officeDocument/2006/relationships" xmlns:p="http://schemas.openxmlformats.org/presentationml/2006/main">
+  <p:cSld>
+    <p:spTree>
+      <p:nvGrpSpPr>
+        <p:cNvPr id="1" name=""/>
+        <p:cNvGrpSpPr/>
+        <p:nvPr/>
+      </p:nvGrpSpPr>
+      <p:grpSpPr>
+        <a:xfrm>
+          <a:off x="0" y="0"/>
+          <a:ext cx="0" cy="0"/>
+          <a:chOff x="0" y="0"/>
+          <a:chExt cx="0" cy="0"/>
+        </a:xfrm>
+      </p:grpSpPr>
+      <p:sp>
+        <p:nvSpPr>
+          <p:cNvPr id="2" name="Title 1">
+            <a:extLst>
+              <a:ext uri="{FF2B5EF4-FFF2-40B4-BE49-F238E27FC236}">
+                <a16:creationId xmlns:a16="http://schemas.microsoft.com/office/drawing/2014/main" id="{B1A0196D-2F51-4389-85FF-A617D7937107}"/>
+              </a:ext>
+            </a:extLst>
+          </p:cNvPr>
+          <p:cNvSpPr>
+            <a:spLocks noGrp="1"/>
+          </p:cNvSpPr>
+          <p:nvPr>
+            <p:ph type="title"/>
+          </p:nvPr>
+        </p:nvSpPr>
+        <p:spPr/>
+        <p:txBody>
+          <a:bodyPr/>
+          <a:lstStyle/>
+          <a:p>
+            <a:r>
+              <a:rPr lang="nl-NL" dirty="0"/>
+              <a:t>MVC Client secure data comm with API</a:t>
+            </a:r>
+            <a:endParaRPr lang="en-NL" dirty="0"/>
+          </a:p>
+        </p:txBody>
+      </p:sp>
+      <p:sp>
+        <p:nvSpPr>
+          <p:cNvPr id="4" name="TextBox 3">
+            <a:extLst>
+              <a:ext uri="{FF2B5EF4-FFF2-40B4-BE49-F238E27FC236}">
+                <a16:creationId xmlns:a16="http://schemas.microsoft.com/office/drawing/2014/main" id="{2DB448E5-BA71-4806-AFDD-5F0322795F7B}"/>
+              </a:ext>
+            </a:extLst>
+          </p:cNvPr>
+          <p:cNvSpPr txBox="1"/>
+          <p:nvPr/>
+        </p:nvSpPr>
+        <p:spPr>
+          <a:xfrm>
+            <a:off x="3101430" y="3429000"/>
+            <a:ext cx="5933034" cy="769441"/>
+          </a:xfrm>
+          <a:prstGeom prst="rect">
+            <a:avLst/>
+          </a:prstGeom>
+          <a:noFill/>
+        </p:spPr>
+        <p:txBody>
+          <a:bodyPr wrap="none" rtlCol="0">
+            <a:spAutoFit/>
+          </a:bodyPr>
+          <a:lstStyle/>
+          <a:p>
+            <a:r>
+              <a:rPr lang="en-US" sz="4400"/>
+              <a:t>Update the </a:t>
+            </a:r>
+            <a:r>
+              <a:rPr lang="en-US" sz="4400" dirty="0"/>
+              <a:t>MVC Client</a:t>
+            </a:r>
+          </a:p>
+        </p:txBody>
+      </p:sp>
+    </p:spTree>
+    <p:extLst>
+      <p:ext uri="{BB962C8B-B14F-4D97-AF65-F5344CB8AC3E}">
+        <p14:creationId xmlns:p14="http://schemas.microsoft.com/office/powerpoint/2010/main" val="4045017707"/>
       </p:ext>
     </p:extLst>
   </p:cSld>

</xml_diff>